<commit_message>
feat: add week-05 resources
</commit_message>
<xml_diff>
--- a/slides/05-tools.pptx
+++ b/slides/05-tools.pptx
@@ -865,7 +865,7 @@
           <a:p>
             <a:fld id="{126DA449-81D0-4C65-80FA-E84926361CC3}" type="datetimeFigureOut">
               <a:rPr lang="en-US" smtClean="0"/>
-              <a:t>3/15/2024</a:t>
+              <a:t>3/18/2024</a:t>
             </a:fld>
             <a:endParaRPr lang="en-US"/>
           </a:p>
@@ -27797,7 +27797,10 @@
           <a:bodyPr/>
           <a:lstStyle/>
           <a:p>
-            <a:endParaRPr lang="en-US" dirty="0"/>
+            <a:r>
+              <a:rPr lang="en-US" dirty="0"/>
+              <a:t>03</a:t>
+            </a:r>
           </a:p>
         </p:txBody>
       </p:sp>
@@ -27822,7 +27825,10 @@
           <a:bodyPr/>
           <a:lstStyle/>
           <a:p>
-            <a:endParaRPr lang="en-US"/>
+            <a:r>
+              <a:rPr lang="en-US" dirty="0"/>
+              <a:t>04</a:t>
+            </a:r>
           </a:p>
         </p:txBody>
       </p:sp>
@@ -27847,7 +27853,10 @@
           <a:bodyPr/>
           <a:lstStyle/>
           <a:p>
-            <a:endParaRPr lang="en-US"/>
+            <a:r>
+              <a:rPr lang="en-US" dirty="0"/>
+              <a:t>05</a:t>
+            </a:r>
           </a:p>
         </p:txBody>
       </p:sp>
@@ -37878,18 +37887,18 @@
 </file>
 
 <file path=customXml/item1.xml><?xml version="1.0" encoding="utf-8"?>
+<p:properties xmlns:p="http://schemas.microsoft.com/office/2006/metadata/properties" xmlns:xsi="http://www.w3.org/2001/XMLSchema-instance" xmlns:pc="http://schemas.microsoft.com/office/infopath/2007/PartnerControls">
+  <documentManagement/>
+</p:properties>
+</file>
+
+<file path=customXml/item2.xml><?xml version="1.0" encoding="utf-8"?>
 <?mso-contentType ?>
 <FormTemplates xmlns="http://schemas.microsoft.com/sharepoint/v3/contenttype/forms">
   <Display>DocumentLibraryForm</Display>
   <Edit>DocumentLibraryForm</Edit>
   <New>DocumentLibraryForm</New>
 </FormTemplates>
-</file>
-
-<file path=customXml/item2.xml><?xml version="1.0" encoding="utf-8"?>
-<p:properties xmlns:p="http://schemas.microsoft.com/office/2006/metadata/properties" xmlns:xsi="http://www.w3.org/2001/XMLSchema-instance" xmlns:pc="http://schemas.microsoft.com/office/infopath/2007/PartnerControls">
-  <documentManagement/>
-</p:properties>
 </file>
 
 <file path=customXml/item3.xml><?xml version="1.0" encoding="utf-8"?>
@@ -38110,18 +38119,18 @@
 </file>
 
 <file path=customXml/itemProps1.xml><?xml version="1.0" encoding="utf-8"?>
-<ds:datastoreItem xmlns:ds="http://schemas.openxmlformats.org/officeDocument/2006/customXml" ds:itemID="{87CA341C-74C1-4577-8C96-EF2605DC526A}">
+<ds:datastoreItem xmlns:ds="http://schemas.openxmlformats.org/officeDocument/2006/customXml" ds:itemID="{412E3419-B313-4514-AD24-D56E1F80A63A}">
   <ds:schemaRefs>
-    <ds:schemaRef ds:uri="http://schemas.microsoft.com/sharepoint/v3/contenttype/forms"/>
+    <ds:schemaRef ds:uri="http://schemas.microsoft.com/office/2006/metadata/properties"/>
+    <ds:schemaRef ds:uri="http://schemas.microsoft.com/office/infopath/2007/PartnerControls"/>
   </ds:schemaRefs>
 </ds:datastoreItem>
 </file>
 
 <file path=customXml/itemProps2.xml><?xml version="1.0" encoding="utf-8"?>
-<ds:datastoreItem xmlns:ds="http://schemas.openxmlformats.org/officeDocument/2006/customXml" ds:itemID="{412E3419-B313-4514-AD24-D56E1F80A63A}">
+<ds:datastoreItem xmlns:ds="http://schemas.openxmlformats.org/officeDocument/2006/customXml" ds:itemID="{87CA341C-74C1-4577-8C96-EF2605DC526A}">
   <ds:schemaRefs>
-    <ds:schemaRef ds:uri="http://schemas.microsoft.com/office/2006/metadata/properties"/>
-    <ds:schemaRef ds:uri="http://schemas.microsoft.com/office/infopath/2007/PartnerControls"/>
+    <ds:schemaRef ds:uri="http://schemas.microsoft.com/sharepoint/v3/contenttype/forms"/>
   </ds:schemaRefs>
 </ds:datastoreItem>
 </file>

</xml_diff>